<commit_message>
Add initial presentation file for CRISP-DM framework
</commit_message>
<xml_diff>
--- a/Eigene_Darstellung_CRISP-DM.pptx
+++ b/Eigene_Darstellung_CRISP-DM.pptx
@@ -105,6 +105,11 @@
       </a:defRPr>
     </a:lvl9pPr>
   </p:defaultTextStyle>
+  <p:extLst>
+    <p:ext uri="{EFAFB233-063F-42B5-8137-9DF3F51BA10A}">
+      <p15:sldGuideLst xmlns:p15="http://schemas.microsoft.com/office/powerpoint/2012/main"/>
+    </p:ext>
+  </p:extLst>
 </p:presentation>
 </file>
 
@@ -6085,7 +6090,7 @@
           <a:p>
             <a:fld id="{1B0E9C73-6538-4741-98E2-DE064369C6EC}" type="datetimeFigureOut">
               <a:rPr lang="de-DE" smtClean="0"/>
-              <a:t>04.09.2025</a:t>
+              <a:t>05.09.2025</a:t>
             </a:fld>
             <a:endParaRPr lang="de-DE"/>
           </a:p>
@@ -6283,7 +6288,7 @@
           <a:p>
             <a:fld id="{1B0E9C73-6538-4741-98E2-DE064369C6EC}" type="datetimeFigureOut">
               <a:rPr lang="de-DE" smtClean="0"/>
-              <a:t>04.09.2025</a:t>
+              <a:t>05.09.2025</a:t>
             </a:fld>
             <a:endParaRPr lang="de-DE"/>
           </a:p>
@@ -6491,7 +6496,7 @@
           <a:p>
             <a:fld id="{1B0E9C73-6538-4741-98E2-DE064369C6EC}" type="datetimeFigureOut">
               <a:rPr lang="de-DE" smtClean="0"/>
-              <a:t>04.09.2025</a:t>
+              <a:t>05.09.2025</a:t>
             </a:fld>
             <a:endParaRPr lang="de-DE"/>
           </a:p>
@@ -6689,7 +6694,7 @@
           <a:p>
             <a:fld id="{1B0E9C73-6538-4741-98E2-DE064369C6EC}" type="datetimeFigureOut">
               <a:rPr lang="de-DE" smtClean="0"/>
-              <a:t>04.09.2025</a:t>
+              <a:t>05.09.2025</a:t>
             </a:fld>
             <a:endParaRPr lang="de-DE"/>
           </a:p>
@@ -6964,7 +6969,7 @@
           <a:p>
             <a:fld id="{1B0E9C73-6538-4741-98E2-DE064369C6EC}" type="datetimeFigureOut">
               <a:rPr lang="de-DE" smtClean="0"/>
-              <a:t>04.09.2025</a:t>
+              <a:t>05.09.2025</a:t>
             </a:fld>
             <a:endParaRPr lang="de-DE"/>
           </a:p>
@@ -7229,7 +7234,7 @@
           <a:p>
             <a:fld id="{1B0E9C73-6538-4741-98E2-DE064369C6EC}" type="datetimeFigureOut">
               <a:rPr lang="de-DE" smtClean="0"/>
-              <a:t>04.09.2025</a:t>
+              <a:t>05.09.2025</a:t>
             </a:fld>
             <a:endParaRPr lang="de-DE"/>
           </a:p>
@@ -7641,7 +7646,7 @@
           <a:p>
             <a:fld id="{1B0E9C73-6538-4741-98E2-DE064369C6EC}" type="datetimeFigureOut">
               <a:rPr lang="de-DE" smtClean="0"/>
-              <a:t>04.09.2025</a:t>
+              <a:t>05.09.2025</a:t>
             </a:fld>
             <a:endParaRPr lang="de-DE"/>
           </a:p>
@@ -7782,7 +7787,7 @@
           <a:p>
             <a:fld id="{1B0E9C73-6538-4741-98E2-DE064369C6EC}" type="datetimeFigureOut">
               <a:rPr lang="de-DE" smtClean="0"/>
-              <a:t>04.09.2025</a:t>
+              <a:t>05.09.2025</a:t>
             </a:fld>
             <a:endParaRPr lang="de-DE"/>
           </a:p>
@@ -7895,7 +7900,7 @@
           <a:p>
             <a:fld id="{1B0E9C73-6538-4741-98E2-DE064369C6EC}" type="datetimeFigureOut">
               <a:rPr lang="de-DE" smtClean="0"/>
-              <a:t>04.09.2025</a:t>
+              <a:t>05.09.2025</a:t>
             </a:fld>
             <a:endParaRPr lang="de-DE"/>
           </a:p>
@@ -8206,7 +8211,7 @@
           <a:p>
             <a:fld id="{1B0E9C73-6538-4741-98E2-DE064369C6EC}" type="datetimeFigureOut">
               <a:rPr lang="de-DE" smtClean="0"/>
-              <a:t>04.09.2025</a:t>
+              <a:t>05.09.2025</a:t>
             </a:fld>
             <a:endParaRPr lang="de-DE"/>
           </a:p>
@@ -8494,7 +8499,7 @@
           <a:p>
             <a:fld id="{1B0E9C73-6538-4741-98E2-DE064369C6EC}" type="datetimeFigureOut">
               <a:rPr lang="de-DE" smtClean="0"/>
-              <a:t>04.09.2025</a:t>
+              <a:t>05.09.2025</a:t>
             </a:fld>
             <a:endParaRPr lang="de-DE"/>
           </a:p>
@@ -8735,7 +8740,7 @@
           <a:p>
             <a:fld id="{1B0E9C73-6538-4741-98E2-DE064369C6EC}" type="datetimeFigureOut">
               <a:rPr lang="de-DE" smtClean="0"/>
-              <a:t>04.09.2025</a:t>
+              <a:t>05.09.2025</a:t>
             </a:fld>
             <a:endParaRPr lang="de-DE"/>
           </a:p>
@@ -9511,7 +9516,7 @@
                 <a:latin typeface="Arial" panose="020B0604020202020204" pitchFamily="34" charset="0"/>
                 <a:cs typeface="Arial" panose="020B0604020202020204" pitchFamily="34" charset="0"/>
               </a:rPr>
-              <a:t>2.1</a:t>
+              <a:t>2.3</a:t>
             </a:r>
           </a:p>
         </p:txBody>
@@ -9558,11 +9563,11 @@
           <a:lstStyle/>
           <a:p>
             <a:r>
-              <a:rPr lang="de-DE" dirty="0">
+              <a:rPr lang="de-DE" sz="1400" dirty="0">
                 <a:latin typeface="Arial" panose="020B0604020202020204" pitchFamily="34" charset="0"/>
                 <a:cs typeface="Arial" panose="020B0604020202020204" pitchFamily="34" charset="0"/>
               </a:rPr>
-              <a:t>2.2</a:t>
+              <a:t>3.1 - 3.2</a:t>
             </a:r>
           </a:p>
         </p:txBody>
@@ -9664,7 +9669,7 @@
                 <a:latin typeface="Arial" panose="020B0604020202020204" pitchFamily="34" charset="0"/>
                 <a:cs typeface="Arial" panose="020B0604020202020204" pitchFamily="34" charset="0"/>
               </a:rPr>
-              <a:t>2.1</a:t>
+              <a:t>2.6</a:t>
             </a:r>
           </a:p>
         </p:txBody>
@@ -9711,11 +9716,11 @@
           <a:lstStyle/>
           <a:p>
             <a:r>
-              <a:rPr lang="de-DE" dirty="0">
+              <a:rPr lang="de-DE" sz="1400" dirty="0">
                 <a:latin typeface="Arial" panose="020B0604020202020204" pitchFamily="34" charset="0"/>
                 <a:cs typeface="Arial" panose="020B0604020202020204" pitchFamily="34" charset="0"/>
               </a:rPr>
-              <a:t>2.2</a:t>
+              <a:t>3.3 – 3.4</a:t>
             </a:r>
           </a:p>
         </p:txBody>
@@ -9762,11 +9767,11 @@
           <a:lstStyle/>
           <a:p>
             <a:r>
-              <a:rPr lang="de-DE" sz="1050" dirty="0">
+              <a:rPr lang="de-DE" sz="2000" dirty="0">
                 <a:latin typeface="Arial" panose="020B0604020202020204" pitchFamily="34" charset="0"/>
                 <a:cs typeface="Arial" panose="020B0604020202020204" pitchFamily="34" charset="0"/>
               </a:rPr>
-              <a:t>Einleitung</a:t>
+              <a:t>2.4</a:t>
             </a:r>
           </a:p>
         </p:txBody>
@@ -9813,11 +9818,11 @@
           <a:lstStyle/>
           <a:p>
             <a:r>
-              <a:rPr lang="de-DE" dirty="0">
+              <a:rPr lang="de-DE" sz="1400" dirty="0">
                 <a:latin typeface="Arial" panose="020B0604020202020204" pitchFamily="34" charset="0"/>
                 <a:cs typeface="Arial" panose="020B0604020202020204" pitchFamily="34" charset="0"/>
               </a:rPr>
-              <a:t>2.1</a:t>
+              <a:t>3.6 – 3.7</a:t>
             </a:r>
           </a:p>
         </p:txBody>
@@ -9864,11 +9869,11 @@
           <a:lstStyle/>
           <a:p>
             <a:r>
-              <a:rPr lang="de-DE" dirty="0">
+              <a:rPr lang="de-DE" sz="1400" dirty="0">
                 <a:latin typeface="Arial" panose="020B0604020202020204" pitchFamily="34" charset="0"/>
                 <a:cs typeface="Arial" panose="020B0604020202020204" pitchFamily="34" charset="0"/>
               </a:rPr>
-              <a:t>2.2</a:t>
+              <a:t>3.6 – 3.7</a:t>
             </a:r>
           </a:p>
         </p:txBody>
@@ -9915,11 +9920,11 @@
           <a:lstStyle/>
           <a:p>
             <a:r>
-              <a:rPr lang="de-DE" sz="1050" dirty="0">
+              <a:rPr lang="de-DE" dirty="0">
                 <a:latin typeface="Arial" panose="020B0604020202020204" pitchFamily="34" charset="0"/>
                 <a:cs typeface="Arial" panose="020B0604020202020204" pitchFamily="34" charset="0"/>
               </a:rPr>
-              <a:t>Einleitung</a:t>
+              <a:t>2.5</a:t>
             </a:r>
           </a:p>
         </p:txBody>
@@ -9970,7 +9975,7 @@
                 <a:latin typeface="Arial" panose="020B0604020202020204" pitchFamily="34" charset="0"/>
                 <a:cs typeface="Arial" panose="020B0604020202020204" pitchFamily="34" charset="0"/>
               </a:rPr>
-              <a:t>2.1</a:t>
+              <a:t>2.6</a:t>
             </a:r>
           </a:p>
         </p:txBody>
@@ -10017,11 +10022,11 @@
           <a:lstStyle/>
           <a:p>
             <a:r>
-              <a:rPr lang="de-DE" dirty="0">
+              <a:rPr lang="de-DE" sz="1400" dirty="0">
                 <a:latin typeface="Arial" panose="020B0604020202020204" pitchFamily="34" charset="0"/>
                 <a:cs typeface="Arial" panose="020B0604020202020204" pitchFamily="34" charset="0"/>
               </a:rPr>
-              <a:t>2.2</a:t>
+              <a:t>4.1 – 4.3</a:t>
             </a:r>
           </a:p>
         </p:txBody>
@@ -10068,12 +10073,16 @@
           <a:lstStyle/>
           <a:p>
             <a:r>
-              <a:rPr lang="de-DE" sz="1050" dirty="0">
+              <a:rPr lang="de-DE" dirty="0">
                 <a:latin typeface="Arial" panose="020B0604020202020204" pitchFamily="34" charset="0"/>
                 <a:cs typeface="Arial" panose="020B0604020202020204" pitchFamily="34" charset="0"/>
               </a:rPr>
-              <a:t>Einleitung</a:t>
+              <a:t>3.10</a:t>
             </a:r>
+            <a:endParaRPr lang="de-DE" sz="1050" dirty="0">
+              <a:latin typeface="Arial" panose="020B0604020202020204" pitchFamily="34" charset="0"/>
+              <a:cs typeface="Arial" panose="020B0604020202020204" pitchFamily="34" charset="0"/>
+            </a:endParaRPr>
           </a:p>
         </p:txBody>
       </p:sp>
@@ -10119,11 +10128,11 @@
           <a:lstStyle/>
           <a:p>
             <a:r>
-              <a:rPr lang="de-DE" dirty="0">
+              <a:rPr lang="de-DE" sz="1400" dirty="0">
                 <a:latin typeface="Arial" panose="020B0604020202020204" pitchFamily="34" charset="0"/>
                 <a:cs typeface="Arial" panose="020B0604020202020204" pitchFamily="34" charset="0"/>
               </a:rPr>
-              <a:t>2.1</a:t>
+              <a:t>5.1 – 5.3</a:t>
             </a:r>
           </a:p>
         </p:txBody>
@@ -10170,11 +10179,11 @@
           <a:lstStyle/>
           <a:p>
             <a:r>
-              <a:rPr lang="de-DE" dirty="0">
+              <a:rPr lang="de-DE" sz="1050" dirty="0">
                 <a:latin typeface="Arial" panose="020B0604020202020204" pitchFamily="34" charset="0"/>
                 <a:cs typeface="Arial" panose="020B0604020202020204" pitchFamily="34" charset="0"/>
               </a:rPr>
-              <a:t>2.2</a:t>
+              <a:t>Anhang</a:t>
             </a:r>
           </a:p>
         </p:txBody>

</xml_diff>